<commit_message>
Added Custom process for some antiinfections
</commit_message>
<xml_diff>
--- a/specs/PRESCRIPTION_0310.pptx
+++ b/specs/PRESCRIPTION_0310.pptx
@@ -211,7 +211,7 @@
           <a:p>
             <a:fld id="{A440604F-B604-4D4B-BD65-62E98D7D1C14}" type="datetimeFigureOut">
               <a:rPr lang="fr-FR" smtClean="0"/>
-              <a:t>04/10/2015</a:t>
+              <a:t>10/10/2015</a:t>
             </a:fld>
             <a:endParaRPr lang="fr-FR"/>
           </a:p>
@@ -1735,7 +1735,7 @@
             </a:r>
             <a:r>
               <a:rPr lang="fr-FR" i="1" baseline="0" dirty="0" smtClean="0"/>
-              <a:t> et le ZELITREX il n’existe qu’un seul dosage, donc on switch cette étape pour eux.</a:t>
+              <a:t> il n’existe qu’un seul dosage, donc on switch cette étape pour eux.</a:t>
             </a:r>
           </a:p>
           <a:p>
@@ -10587,7 +10587,7 @@
           <a:p>
             <a:fld id="{5228238D-62C9-4665-9605-F66906239C92}" type="datetimeFigureOut">
               <a:rPr lang="fr-FR" smtClean="0"/>
-              <a:t>04/10/2015</a:t>
+              <a:t>10/10/2015</a:t>
             </a:fld>
             <a:endParaRPr lang="fr-FR"/>
           </a:p>
@@ -10794,7 +10794,7 @@
           <a:p>
             <a:fld id="{5228238D-62C9-4665-9605-F66906239C92}" type="datetimeFigureOut">
               <a:rPr lang="fr-FR" smtClean="0"/>
-              <a:t>04/10/2015</a:t>
+              <a:t>10/10/2015</a:t>
             </a:fld>
             <a:endParaRPr lang="fr-FR"/>
           </a:p>
@@ -10974,7 +10974,7 @@
           <a:p>
             <a:fld id="{5228238D-62C9-4665-9605-F66906239C92}" type="datetimeFigureOut">
               <a:rPr lang="fr-FR" smtClean="0"/>
-              <a:t>04/10/2015</a:t>
+              <a:t>10/10/2015</a:t>
             </a:fld>
             <a:endParaRPr lang="fr-FR"/>
           </a:p>
@@ -11179,7 +11179,7 @@
           <a:p>
             <a:fld id="{5228238D-62C9-4665-9605-F66906239C92}" type="datetimeFigureOut">
               <a:rPr lang="fr-FR" smtClean="0"/>
-              <a:t>04/10/2015</a:t>
+              <a:t>10/10/2015</a:t>
             </a:fld>
             <a:endParaRPr lang="fr-FR"/>
           </a:p>
@@ -20077,7 +20077,7 @@
           <a:p>
             <a:fld id="{5228238D-62C9-4665-9605-F66906239C92}" type="datetimeFigureOut">
               <a:rPr lang="fr-FR" smtClean="0"/>
-              <a:t>04/10/2015</a:t>
+              <a:t>10/10/2015</a:t>
             </a:fld>
             <a:endParaRPr lang="fr-FR"/>
           </a:p>
@@ -20351,7 +20351,7 @@
           <a:p>
             <a:fld id="{5228238D-62C9-4665-9605-F66906239C92}" type="datetimeFigureOut">
               <a:rPr lang="fr-FR" smtClean="0"/>
-              <a:t>04/10/2015</a:t>
+              <a:t>10/10/2015</a:t>
             </a:fld>
             <a:endParaRPr lang="fr-FR"/>
           </a:p>
@@ -20749,7 +20749,7 @@
           <a:p>
             <a:fld id="{5228238D-62C9-4665-9605-F66906239C92}" type="datetimeFigureOut">
               <a:rPr lang="fr-FR" smtClean="0"/>
-              <a:t>04/10/2015</a:t>
+              <a:t>10/10/2015</a:t>
             </a:fld>
             <a:endParaRPr lang="fr-FR"/>
           </a:p>
@@ -20867,7 +20867,7 @@
           <a:p>
             <a:fld id="{5228238D-62C9-4665-9605-F66906239C92}" type="datetimeFigureOut">
               <a:rPr lang="fr-FR" smtClean="0"/>
-              <a:t>04/10/2015</a:t>
+              <a:t>10/10/2015</a:t>
             </a:fld>
             <a:endParaRPr lang="fr-FR"/>
           </a:p>
@@ -20962,7 +20962,7 @@
           <a:p>
             <a:fld id="{5228238D-62C9-4665-9605-F66906239C92}" type="datetimeFigureOut">
               <a:rPr lang="fr-FR" smtClean="0"/>
-              <a:t>04/10/2015</a:t>
+              <a:t>10/10/2015</a:t>
             </a:fld>
             <a:endParaRPr lang="fr-FR"/>
           </a:p>
@@ -21252,7 +21252,7 @@
           <a:p>
             <a:fld id="{5228238D-62C9-4665-9605-F66906239C92}" type="datetimeFigureOut">
               <a:rPr lang="fr-FR" smtClean="0"/>
-              <a:t>04/10/2015</a:t>
+              <a:t>10/10/2015</a:t>
             </a:fld>
             <a:endParaRPr lang="fr-FR"/>
           </a:p>
@@ -21532,7 +21532,7 @@
           <a:p>
             <a:fld id="{5228238D-62C9-4665-9605-F66906239C92}" type="datetimeFigureOut">
               <a:rPr lang="fr-FR" smtClean="0"/>
-              <a:t>04/10/2015</a:t>
+              <a:t>10/10/2015</a:t>
             </a:fld>
             <a:endParaRPr lang="fr-FR"/>
           </a:p>
@@ -21782,7 +21782,7 @@
           <a:p>
             <a:fld id="{5228238D-62C9-4665-9605-F66906239C92}" type="datetimeFigureOut">
               <a:rPr lang="fr-FR" smtClean="0"/>
-              <a:t>04/10/2015</a:t>
+              <a:t>10/10/2015</a:t>
             </a:fld>
             <a:endParaRPr lang="fr-FR"/>
           </a:p>
@@ -23819,7 +23819,7 @@
         <p:spPr>
           <a:xfrm>
             <a:off x="4139782" y="3691998"/>
-            <a:ext cx="2261018" cy="646331"/>
+            <a:ext cx="2261018" cy="369332"/>
           </a:xfrm>
           <a:prstGeom prst="rect">
             <a:avLst/>
@@ -23834,9 +23834,8 @@
           <a:p>
             <a:r>
               <a:rPr lang="fr-FR" dirty="0" smtClean="0"/>
-              <a:t>Date de prise le : JJ/MM/AAAA</a:t>
-            </a:r>
-            <a:endParaRPr lang="fr-FR" dirty="0"/>
+              <a:t>Date de prise le : JJ</a:t>
+            </a:r>
           </a:p>
         </p:txBody>
       </p:sp>
@@ -24042,7 +24041,6 @@
               <a:rPr lang="fr-FR" dirty="0" smtClean="0"/>
               <a:t>®…</a:t>
             </a:r>
-            <a:endParaRPr lang="fr-FR" dirty="0" smtClean="0"/>
           </a:p>
           <a:p>
             <a:pPr marL="0" indent="0">
@@ -24166,8 +24164,15 @@
           <a:p>
             <a:r>
               <a:rPr lang="fr-FR" dirty="0" smtClean="0"/>
-              <a:t>Date de prise le : JJ/MM/AAAA</a:t>
-            </a:r>
+              <a:t>Date de prise le : </a:t>
+            </a:r>
+            <a:r>
+              <a:rPr lang="fr-FR" dirty="0" smtClean="0"/>
+              <a:t>JJ</a:t>
+            </a:r>
+            <a:endParaRPr lang="fr-FR" dirty="0"/>
+          </a:p>
+          <a:p>
             <a:endParaRPr lang="fr-FR" dirty="0"/>
           </a:p>
         </p:txBody>
@@ -27728,7 +27733,7 @@
         <p:spPr>
           <a:xfrm>
             <a:off x="7659974" y="1618938"/>
-            <a:ext cx="4212236" cy="2246769"/>
+            <a:ext cx="4212236" cy="2554545"/>
           </a:xfrm>
           <a:prstGeom prst="rect">
             <a:avLst/>
@@ -27747,8 +27752,17 @@
                   <a:srgbClr val="FF0000"/>
                 </a:solidFill>
               </a:rPr>
-              <a:t>SITUATION NUMERO 1 : NOXAFIL comprimé, les VFEND et ROVALCYTE</a:t>
-            </a:r>
+              <a:t>SITUATION NUMERO 1 : NOXAFIL comprimé, les VFEND et ROVALCYTE, </a:t>
+            </a:r>
+            <a:r>
+              <a:rPr lang="fr-FR" sz="2000" i="1" dirty="0"/>
+              <a:t>ZELITREX </a:t>
+            </a:r>
+            <a:endParaRPr lang="fr-FR" sz="2000" b="1" dirty="0" smtClean="0">
+              <a:solidFill>
+                <a:srgbClr val="FF0000"/>
+              </a:solidFill>
+            </a:endParaRPr>
           </a:p>
           <a:p>
             <a:endParaRPr lang="fr-FR" sz="2000" b="1" dirty="0">

</xml_diff>